<commit_message>
add what will i do
</commit_message>
<xml_diff>
--- a/presentation.pptx
+++ b/presentation.pptx
@@ -6725,6 +6725,24 @@
           <a:p>
             <a:r>
               <a:rPr lang="en-US" altLang="ko-KR" dirty="0"/>
+              <a:t>Add error handling(API key expired, csv </a:t>
+            </a:r>
+            <a:r>
+              <a:rPr lang="en-US" altLang="ko-KR"/>
+              <a:t>syntax error, </a:t>
+            </a:r>
+            <a:r>
+              <a:rPr lang="en-US" altLang="ko-KR" dirty="0" err="1"/>
+              <a:t>etc</a:t>
+            </a:r>
+            <a:r>
+              <a:rPr lang="en-US" altLang="ko-KR" dirty="0"/>
+              <a:t>)</a:t>
+            </a:r>
+          </a:p>
+          <a:p>
+            <a:r>
+              <a:rPr lang="en-US" altLang="ko-KR" dirty="0"/>
               <a:t>And so on…</a:t>
             </a:r>
           </a:p>

</xml_diff>